<commit_message>
docs(jaehoo1) : ppt 오타 수정
</commit_message>
<xml_diff>
--- a/10. 전역 변수의 문제점/presentation10/Maljaaa/전역변수의 문제점.pptx
+++ b/10. 전역 변수의 문제점/presentation10/Maljaaa/전역변수의 문제점.pptx
@@ -17,16 +17,16 @@
   <p:notesSz cx="6858000" cy="9144000"/>
   <p:embeddedFontLst>
     <p:embeddedFont>
-      <p:font typeface="맑은 고딕" panose="020B0503020000020004" pitchFamily="34" charset="-127"/>
-      <p:regular r:id="rId9"/>
+      <p:font typeface="나눔스퀘어 Bold" panose="020B0600000101010101" pitchFamily="50" charset="-127"/>
+      <p:bold r:id="rId9"/>
+    </p:embeddedFont>
+    <p:embeddedFont>
+      <p:font typeface="나눔스퀘어 ExtraBold" panose="020B0600000101010101" pitchFamily="50" charset="-127"/>
       <p:bold r:id="rId10"/>
     </p:embeddedFont>
     <p:embeddedFont>
-      <p:font typeface="나눔스퀘어 Bold" panose="020B0600000101010101" pitchFamily="34" charset="-127"/>
-      <p:bold r:id="rId11"/>
-    </p:embeddedFont>
-    <p:embeddedFont>
-      <p:font typeface="나눔스퀘어 ExtraBold" panose="020B0600000101010101" pitchFamily="34" charset="-127"/>
+      <p:font typeface="맑은 고딕" panose="020B0503020000020004" pitchFamily="50" charset="-127"/>
+      <p:regular r:id="rId11"/>
       <p:bold r:id="rId12"/>
     </p:embeddedFont>
   </p:embeddedFontLst>
@@ -286,7 +286,7 @@
           <a:p>
             <a:fld id="{BF6E7CB9-552A-40FD-8E25-6C9525410464}" type="datetimeFigureOut">
               <a:rPr lang="ko-KR" altLang="en-US" smtClean="0"/>
-              <a:t>2022. 11. 3.</a:t>
+              <a:t>2022-11-08</a:t>
             </a:fld>
             <a:endParaRPr lang="ko-KR" altLang="en-US"/>
           </a:p>
@@ -484,7 +484,7 @@
           <a:p>
             <a:fld id="{BF6E7CB9-552A-40FD-8E25-6C9525410464}" type="datetimeFigureOut">
               <a:rPr lang="ko-KR" altLang="en-US" smtClean="0"/>
-              <a:t>2022. 11. 3.</a:t>
+              <a:t>2022-11-08</a:t>
             </a:fld>
             <a:endParaRPr lang="ko-KR" altLang="en-US"/>
           </a:p>
@@ -692,7 +692,7 @@
           <a:p>
             <a:fld id="{BF6E7CB9-552A-40FD-8E25-6C9525410464}" type="datetimeFigureOut">
               <a:rPr lang="ko-KR" altLang="en-US" smtClean="0"/>
-              <a:t>2022. 11. 3.</a:t>
+              <a:t>2022-11-08</a:t>
             </a:fld>
             <a:endParaRPr lang="ko-KR" altLang="en-US"/>
           </a:p>
@@ -890,7 +890,7 @@
           <a:p>
             <a:fld id="{BF6E7CB9-552A-40FD-8E25-6C9525410464}" type="datetimeFigureOut">
               <a:rPr lang="ko-KR" altLang="en-US" smtClean="0"/>
-              <a:t>2022. 11. 3.</a:t>
+              <a:t>2022-11-08</a:t>
             </a:fld>
             <a:endParaRPr lang="ko-KR" altLang="en-US"/>
           </a:p>
@@ -1165,7 +1165,7 @@
           <a:p>
             <a:fld id="{BF6E7CB9-552A-40FD-8E25-6C9525410464}" type="datetimeFigureOut">
               <a:rPr lang="ko-KR" altLang="en-US" smtClean="0"/>
-              <a:t>2022. 11. 3.</a:t>
+              <a:t>2022-11-08</a:t>
             </a:fld>
             <a:endParaRPr lang="ko-KR" altLang="en-US"/>
           </a:p>
@@ -1430,7 +1430,7 @@
           <a:p>
             <a:fld id="{BF6E7CB9-552A-40FD-8E25-6C9525410464}" type="datetimeFigureOut">
               <a:rPr lang="ko-KR" altLang="en-US" smtClean="0"/>
-              <a:t>2022. 11. 3.</a:t>
+              <a:t>2022-11-08</a:t>
             </a:fld>
             <a:endParaRPr lang="ko-KR" altLang="en-US"/>
           </a:p>
@@ -1842,7 +1842,7 @@
           <a:p>
             <a:fld id="{BF6E7CB9-552A-40FD-8E25-6C9525410464}" type="datetimeFigureOut">
               <a:rPr lang="ko-KR" altLang="en-US" smtClean="0"/>
-              <a:t>2022. 11. 3.</a:t>
+              <a:t>2022-11-08</a:t>
             </a:fld>
             <a:endParaRPr lang="ko-KR" altLang="en-US"/>
           </a:p>
@@ -1983,7 +1983,7 @@
           <a:p>
             <a:fld id="{BF6E7CB9-552A-40FD-8E25-6C9525410464}" type="datetimeFigureOut">
               <a:rPr lang="ko-KR" altLang="en-US" smtClean="0"/>
-              <a:t>2022. 11. 3.</a:t>
+              <a:t>2022-11-08</a:t>
             </a:fld>
             <a:endParaRPr lang="ko-KR" altLang="en-US"/>
           </a:p>
@@ -2096,7 +2096,7 @@
           <a:p>
             <a:fld id="{BF6E7CB9-552A-40FD-8E25-6C9525410464}" type="datetimeFigureOut">
               <a:rPr lang="ko-KR" altLang="en-US" smtClean="0"/>
-              <a:t>2022. 11. 3.</a:t>
+              <a:t>2022-11-08</a:t>
             </a:fld>
             <a:endParaRPr lang="ko-KR" altLang="en-US"/>
           </a:p>
@@ -2407,7 +2407,7 @@
           <a:p>
             <a:fld id="{BF6E7CB9-552A-40FD-8E25-6C9525410464}" type="datetimeFigureOut">
               <a:rPr lang="ko-KR" altLang="en-US" smtClean="0"/>
-              <a:t>2022. 11. 3.</a:t>
+              <a:t>2022-11-08</a:t>
             </a:fld>
             <a:endParaRPr lang="ko-KR" altLang="en-US"/>
           </a:p>
@@ -2695,7 +2695,7 @@
           <a:p>
             <a:fld id="{BF6E7CB9-552A-40FD-8E25-6C9525410464}" type="datetimeFigureOut">
               <a:rPr lang="ko-KR" altLang="en-US" smtClean="0"/>
-              <a:t>2022. 11. 3.</a:t>
+              <a:t>2022-11-08</a:t>
             </a:fld>
             <a:endParaRPr lang="ko-KR" altLang="en-US"/>
           </a:p>
@@ -2939,7 +2939,7 @@
           <a:p>
             <a:fld id="{BF6E7CB9-552A-40FD-8E25-6C9525410464}" type="datetimeFigureOut">
               <a:rPr lang="ko-KR" altLang="en-US" smtClean="0"/>
-              <a:t>2022. 11. 3.</a:t>
+              <a:t>2022-11-08</a:t>
             </a:fld>
             <a:endParaRPr lang="ko-KR" altLang="en-US"/>
           </a:p>
@@ -3622,7 +3622,7 @@
                 <a:latin typeface="나눔스퀘어 Bold" panose="020B0600000101010101" pitchFamily="50" charset="-127"/>
                 <a:ea typeface="나눔스퀘어 Bold" panose="020B0600000101010101" pitchFamily="50" charset="-127"/>
               </a:rPr>
-              <a:t>p.203</a:t>
+              <a:t>p. 203</a:t>
             </a:r>
             <a:endParaRPr lang="ko-KR" altLang="en-US" sz="2400" spc="100" dirty="0">
               <a:solidFill>
@@ -4384,7 +4384,7 @@
                 <a:latin typeface="나눔스퀘어 Bold" panose="020B0600000101010101" pitchFamily="50" charset="-127"/>
                 <a:ea typeface="나눔스퀘어 Bold" panose="020B0600000101010101" pitchFamily="50" charset="-127"/>
               </a:rPr>
-              <a:t>p.203</a:t>
+              <a:t>p. 203</a:t>
             </a:r>
             <a:endParaRPr lang="ko-KR" altLang="en-US" sz="2400" spc="100" dirty="0">
               <a:solidFill>
@@ -5300,7 +5300,7 @@
                 <a:latin typeface="나눔스퀘어 Bold" panose="020B0600000101010101" pitchFamily="50" charset="-127"/>
                 <a:ea typeface="나눔스퀘어 Bold" panose="020B0600000101010101" pitchFamily="50" charset="-127"/>
               </a:rPr>
-              <a:t>p.203</a:t>
+              <a:t>p. 203</a:t>
             </a:r>
             <a:endParaRPr lang="ko-KR" altLang="en-US" sz="2400" spc="100" dirty="0">
               <a:solidFill>
@@ -6344,7 +6344,7 @@
                 <a:latin typeface="나눔스퀘어 Bold" panose="020B0600000101010101" pitchFamily="50" charset="-127"/>
                 <a:ea typeface="나눔스퀘어 Bold" panose="020B0600000101010101" pitchFamily="50" charset="-127"/>
               </a:rPr>
-              <a:t>p.203</a:t>
+              <a:t>p. 203</a:t>
             </a:r>
             <a:endParaRPr lang="ko-KR" altLang="en-US" sz="2400" spc="100" dirty="0">
               <a:solidFill>
@@ -6895,7 +6895,7 @@
                 <a:latin typeface="나눔스퀘어 Bold" panose="020B0600000101010101" pitchFamily="50" charset="-127"/>
                 <a:ea typeface="나눔스퀘어 Bold" panose="020B0600000101010101" pitchFamily="50" charset="-127"/>
               </a:rPr>
-              <a:t>p.203</a:t>
+              <a:t>p. 203</a:t>
             </a:r>
             <a:endParaRPr lang="ko-KR" altLang="en-US" sz="2400" spc="100" dirty="0">
               <a:solidFill>
@@ -7670,7 +7670,7 @@
                 <a:latin typeface="나눔스퀘어 Bold" panose="020B0600000101010101" pitchFamily="50" charset="-127"/>
                 <a:ea typeface="나눔스퀘어 Bold" panose="020B0600000101010101" pitchFamily="50" charset="-127"/>
               </a:rPr>
-              <a:t>p.203</a:t>
+              <a:t>p. 203</a:t>
             </a:r>
             <a:endParaRPr lang="ko-KR" altLang="en-US" sz="2400" spc="100" dirty="0">
               <a:solidFill>

</xml_diff>